<commit_message>
Added seats_available and airline name columns
</commit_message>
<xml_diff>
--- a/docs/planningdocuments/sql_tables.pptx
+++ b/docs/planningdocuments/sql_tables.pptx
@@ -3341,14 +3341,14 @@
           <p:nvPr>
             <p:extLst>
               <p:ext uri="{D42A27DB-BD31-4B8C-83A1-F6EECF244321}">
-                <p14:modId xmlns:p14="http://schemas.microsoft.com/office/powerpoint/2010/main" val="1815487378"/>
+                <p14:modId xmlns:p14="http://schemas.microsoft.com/office/powerpoint/2010/main" val="3416753678"/>
               </p:ext>
             </p:extLst>
           </p:nvPr>
         </p:nvGraphicFramePr>
         <p:xfrm>
-          <a:off x="679063" y="514393"/>
-          <a:ext cx="3053182" cy="4820920"/>
+          <a:off x="661439" y="272005"/>
+          <a:ext cx="3053182" cy="5191760"/>
         </p:xfrm>
         <a:graphic>
           <a:graphicData uri="http://schemas.openxmlformats.org/drawingml/2006/table">
@@ -3627,7 +3627,7 @@
                     <a:p>
                       <a:r>
                         <a:rPr lang="en-US" dirty="0"/>
-                        <a:t>int(25)</a:t>
+                        <a:t>int(4)</a:t>
                       </a:r>
                     </a:p>
                   </a:txBody>
@@ -3806,6 +3806,40 @@
                 <a:extLst>
                   <a:ext uri="{0D108BD9-81ED-4DB2-BD59-A6C34878D82A}">
                     <a16:rowId xmlns:a16="http://schemas.microsoft.com/office/drawing/2014/main" val="3441599101"/>
+                  </a:ext>
+                </a:extLst>
+              </a:tr>
+              <a:tr h="370840">
+                <a:tc>
+                  <a:txBody>
+                    <a:bodyPr/>
+                    <a:lstStyle/>
+                    <a:p>
+                      <a:r>
+                        <a:rPr lang="en-US" dirty="0" err="1"/>
+                        <a:t>seats_available</a:t>
+                      </a:r>
+                      <a:endParaRPr lang="en-US" dirty="0"/>
+                    </a:p>
+                  </a:txBody>
+                  <a:tcPr/>
+                </a:tc>
+                <a:tc>
+                  <a:txBody>
+                    <a:bodyPr/>
+                    <a:lstStyle/>
+                    <a:p>
+                      <a:r>
+                        <a:rPr lang="en-US" dirty="0"/>
+                        <a:t>int(4)</a:t>
+                      </a:r>
+                    </a:p>
+                  </a:txBody>
+                  <a:tcPr/>
+                </a:tc>
+                <a:extLst>
+                  <a:ext uri="{0D108BD9-81ED-4DB2-BD59-A6C34878D82A}">
+                    <a16:rowId xmlns:a16="http://schemas.microsoft.com/office/drawing/2014/main" val="515373835"/>
                   </a:ext>
                 </a:extLst>
               </a:tr>
@@ -4076,14 +4110,14 @@
           <p:nvPr>
             <p:extLst>
               <p:ext uri="{D42A27DB-BD31-4B8C-83A1-F6EECF244321}">
-                <p14:modId xmlns:p14="http://schemas.microsoft.com/office/powerpoint/2010/main" val="4160581036"/>
+                <p14:modId xmlns:p14="http://schemas.microsoft.com/office/powerpoint/2010/main" val="793508434"/>
               </p:ext>
             </p:extLst>
           </p:nvPr>
         </p:nvGraphicFramePr>
         <p:xfrm>
-          <a:off x="4383315" y="514393"/>
-          <a:ext cx="2464318" cy="741680"/>
+          <a:off x="4383315" y="272005"/>
+          <a:ext cx="2464318" cy="1112520"/>
         </p:xfrm>
         <a:graphic>
           <a:graphicData uri="http://schemas.openxmlformats.org/drawingml/2006/table">
@@ -4170,6 +4204,39 @@
                 <a:extLst>
                   <a:ext uri="{0D108BD9-81ED-4DB2-BD59-A6C34878D82A}">
                     <a16:rowId xmlns:a16="http://schemas.microsoft.com/office/drawing/2014/main" val="2325399729"/>
+                  </a:ext>
+                </a:extLst>
+              </a:tr>
+              <a:tr h="370840">
+                <a:tc>
+                  <a:txBody>
+                    <a:bodyPr/>
+                    <a:lstStyle/>
+                    <a:p>
+                      <a:r>
+                        <a:rPr lang="en-US" dirty="0"/>
+                        <a:t>name</a:t>
+                      </a:r>
+                    </a:p>
+                  </a:txBody>
+                  <a:tcPr/>
+                </a:tc>
+                <a:tc>
+                  <a:txBody>
+                    <a:bodyPr/>
+                    <a:lstStyle/>
+                    <a:p>
+                      <a:r>
+                        <a:rPr lang="en-US" dirty="0"/>
+                        <a:t>varchar(25)</a:t>
+                      </a:r>
+                    </a:p>
+                  </a:txBody>
+                  <a:tcPr/>
+                </a:tc>
+                <a:extLst>
+                  <a:ext uri="{0D108BD9-81ED-4DB2-BD59-A6C34878D82A}">
+                    <a16:rowId xmlns:a16="http://schemas.microsoft.com/office/drawing/2014/main" val="1546810561"/>
                   </a:ext>
                 </a:extLst>
               </a:tr>
@@ -6073,13 +6140,15 @@
               </a:ext>
             </a:extLst>
           </p:cNvPr>
-          <p:cNvCxnSpPr/>
+          <p:cNvCxnSpPr>
+            <a:cxnSpLocks/>
+          </p:cNvCxnSpPr>
           <p:nvPr/>
         </p:nvCxnSpPr>
         <p:spPr>
           <a:xfrm flipH="1" flipV="1">
-            <a:off x="3732245" y="1840375"/>
-            <a:ext cx="2685144" cy="289367"/>
+            <a:off x="3714621" y="1559570"/>
+            <a:ext cx="2702768" cy="570172"/>
           </a:xfrm>
           <a:prstGeom prst="straightConnector1">
             <a:avLst/>
@@ -6112,13 +6181,15 @@
               </a:ext>
             </a:extLst>
           </p:cNvPr>
-          <p:cNvCxnSpPr/>
+          <p:cNvCxnSpPr>
+            <a:cxnSpLocks/>
+          </p:cNvCxnSpPr>
           <p:nvPr/>
         </p:nvCxnSpPr>
         <p:spPr>
-          <a:xfrm flipH="1">
-            <a:off x="3732245" y="2129742"/>
-            <a:ext cx="2685144" cy="0"/>
+          <a:xfrm flipH="1" flipV="1">
+            <a:off x="3671597" y="1959429"/>
+            <a:ext cx="2745792" cy="170313"/>
           </a:xfrm>
           <a:prstGeom prst="straightConnector1">
             <a:avLst/>
@@ -6424,13 +6495,57 @@
               </a:ext>
             </a:extLst>
           </p:cNvPr>
-          <p:cNvCxnSpPr/>
+          <p:cNvCxnSpPr>
+            <a:cxnSpLocks/>
+            <a:stCxn id="17" idx="1"/>
+          </p:cNvCxnSpPr>
           <p:nvPr/>
         </p:nvCxnSpPr>
         <p:spPr>
           <a:xfrm flipH="1">
-            <a:off x="3732245" y="994886"/>
-            <a:ext cx="651070" cy="428800"/>
+            <a:off x="3714621" y="828265"/>
+            <a:ext cx="668694" cy="372987"/>
+          </a:xfrm>
+          <a:prstGeom prst="straightConnector1">
+            <a:avLst/>
+          </a:prstGeom>
+          <a:ln>
+            <a:tailEnd type="triangle"/>
+          </a:ln>
+        </p:spPr>
+        <p:style>
+          <a:lnRef idx="1">
+            <a:schemeClr val="accent1"/>
+          </a:lnRef>
+          <a:fillRef idx="0">
+            <a:schemeClr val="accent1"/>
+          </a:fillRef>
+          <a:effectRef idx="0">
+            <a:schemeClr val="accent1"/>
+          </a:effectRef>
+          <a:fontRef idx="minor">
+            <a:schemeClr val="tx1"/>
+          </a:fontRef>
+        </p:style>
+      </p:cxnSp>
+      <p:cxnSp>
+        <p:nvCxnSpPr>
+          <p:cNvPr id="13" name="Straight Arrow Connector 12">
+            <a:extLst>
+              <a:ext uri="{FF2B5EF4-FFF2-40B4-BE49-F238E27FC236}">
+                <a16:creationId xmlns:a16="http://schemas.microsoft.com/office/drawing/2014/main" id="{E26F84E5-1CA6-035A-01A1-D1AAA99DA1C1}"/>
+              </a:ext>
+            </a:extLst>
+          </p:cNvPr>
+          <p:cNvCxnSpPr>
+            <a:cxnSpLocks/>
+          </p:cNvCxnSpPr>
+          <p:nvPr/>
+        </p:nvCxnSpPr>
+        <p:spPr>
+          <a:xfrm>
+            <a:off x="3671597" y="752995"/>
+            <a:ext cx="859451" cy="4582318"/>
           </a:xfrm>
           <a:prstGeom prst="straightConnector1">
             <a:avLst/>

</xml_diff>

<commit_message>
Add airports planning spreadsheet and update sql_tables.pptx
</commit_message>
<xml_diff>
--- a/docs/planningdocuments/sql_tables.pptx
+++ b/docs/planningdocuments/sql_tables.pptx
@@ -259,7 +259,7 @@
           <a:p>
             <a:fld id="{D1E294F7-EB46-49F9-8C0F-71C30717E95B}" type="datetimeFigureOut">
               <a:rPr lang="en-US" smtClean="0"/>
-              <a:t>10/2/2023</a:t>
+              <a:t>10/7/2023</a:t>
             </a:fld>
             <a:endParaRPr lang="en-US"/>
           </a:p>
@@ -457,7 +457,7 @@
           <a:p>
             <a:fld id="{D1E294F7-EB46-49F9-8C0F-71C30717E95B}" type="datetimeFigureOut">
               <a:rPr lang="en-US" smtClean="0"/>
-              <a:t>10/2/2023</a:t>
+              <a:t>10/7/2023</a:t>
             </a:fld>
             <a:endParaRPr lang="en-US"/>
           </a:p>
@@ -665,7 +665,7 @@
           <a:p>
             <a:fld id="{D1E294F7-EB46-49F9-8C0F-71C30717E95B}" type="datetimeFigureOut">
               <a:rPr lang="en-US" smtClean="0"/>
-              <a:t>10/2/2023</a:t>
+              <a:t>10/7/2023</a:t>
             </a:fld>
             <a:endParaRPr lang="en-US"/>
           </a:p>
@@ -863,7 +863,7 @@
           <a:p>
             <a:fld id="{D1E294F7-EB46-49F9-8C0F-71C30717E95B}" type="datetimeFigureOut">
               <a:rPr lang="en-US" smtClean="0"/>
-              <a:t>10/2/2023</a:t>
+              <a:t>10/7/2023</a:t>
             </a:fld>
             <a:endParaRPr lang="en-US"/>
           </a:p>
@@ -1138,7 +1138,7 @@
           <a:p>
             <a:fld id="{D1E294F7-EB46-49F9-8C0F-71C30717E95B}" type="datetimeFigureOut">
               <a:rPr lang="en-US" smtClean="0"/>
-              <a:t>10/2/2023</a:t>
+              <a:t>10/7/2023</a:t>
             </a:fld>
             <a:endParaRPr lang="en-US"/>
           </a:p>
@@ -1403,7 +1403,7 @@
           <a:p>
             <a:fld id="{D1E294F7-EB46-49F9-8C0F-71C30717E95B}" type="datetimeFigureOut">
               <a:rPr lang="en-US" smtClean="0"/>
-              <a:t>10/2/2023</a:t>
+              <a:t>10/7/2023</a:t>
             </a:fld>
             <a:endParaRPr lang="en-US"/>
           </a:p>
@@ -1815,7 +1815,7 @@
           <a:p>
             <a:fld id="{D1E294F7-EB46-49F9-8C0F-71C30717E95B}" type="datetimeFigureOut">
               <a:rPr lang="en-US" smtClean="0"/>
-              <a:t>10/2/2023</a:t>
+              <a:t>10/7/2023</a:t>
             </a:fld>
             <a:endParaRPr lang="en-US"/>
           </a:p>
@@ -1956,7 +1956,7 @@
           <a:p>
             <a:fld id="{D1E294F7-EB46-49F9-8C0F-71C30717E95B}" type="datetimeFigureOut">
               <a:rPr lang="en-US" smtClean="0"/>
-              <a:t>10/2/2023</a:t>
+              <a:t>10/7/2023</a:t>
             </a:fld>
             <a:endParaRPr lang="en-US"/>
           </a:p>
@@ -2069,7 +2069,7 @@
           <a:p>
             <a:fld id="{D1E294F7-EB46-49F9-8C0F-71C30717E95B}" type="datetimeFigureOut">
               <a:rPr lang="en-US" smtClean="0"/>
-              <a:t>10/2/2023</a:t>
+              <a:t>10/7/2023</a:t>
             </a:fld>
             <a:endParaRPr lang="en-US"/>
           </a:p>
@@ -2380,7 +2380,7 @@
           <a:p>
             <a:fld id="{D1E294F7-EB46-49F9-8C0F-71C30717E95B}" type="datetimeFigureOut">
               <a:rPr lang="en-US" smtClean="0"/>
-              <a:t>10/2/2023</a:t>
+              <a:t>10/7/2023</a:t>
             </a:fld>
             <a:endParaRPr lang="en-US"/>
           </a:p>
@@ -2668,7 +2668,7 @@
           <a:p>
             <a:fld id="{D1E294F7-EB46-49F9-8C0F-71C30717E95B}" type="datetimeFigureOut">
               <a:rPr lang="en-US" smtClean="0"/>
-              <a:t>10/2/2023</a:t>
+              <a:t>10/7/2023</a:t>
             </a:fld>
             <a:endParaRPr lang="en-US"/>
           </a:p>
@@ -2909,7 +2909,7 @@
           <a:p>
             <a:fld id="{D1E294F7-EB46-49F9-8C0F-71C30717E95B}" type="datetimeFigureOut">
               <a:rPr lang="en-US" smtClean="0"/>
-              <a:t>10/2/2023</a:t>
+              <a:t>10/7/2023</a:t>
             </a:fld>
             <a:endParaRPr lang="en-US"/>
           </a:p>
@@ -3862,14 +3862,14 @@
           <p:nvPr>
             <p:extLst>
               <p:ext uri="{D42A27DB-BD31-4B8C-83A1-F6EECF244321}">
-                <p14:modId xmlns:p14="http://schemas.microsoft.com/office/powerpoint/2010/main" val="3978035281"/>
+                <p14:modId xmlns:p14="http://schemas.microsoft.com/office/powerpoint/2010/main" val="3880638282"/>
               </p:ext>
             </p:extLst>
           </p:nvPr>
         </p:nvGraphicFramePr>
         <p:xfrm>
-          <a:off x="6417389" y="1603242"/>
-          <a:ext cx="2605314" cy="2225040"/>
+          <a:off x="6513027" y="1388907"/>
+          <a:ext cx="2605314" cy="2595880"/>
         </p:xfrm>
         <a:graphic>
           <a:graphicData uri="http://schemas.openxmlformats.org/drawingml/2006/table">
@@ -3967,20 +3967,20 @@
                     <a:p>
                       <a:r>
                         <a:rPr lang="en-US" dirty="0"/>
-                        <a:t>code</a:t>
-                      </a:r>
-                    </a:p>
-                  </a:txBody>
-                  <a:tcPr/>
-                </a:tc>
-                <a:tc>
-                  <a:txBody>
-                    <a:bodyPr/>
-                    <a:lstStyle/>
-                    <a:p>
-                      <a:r>
-                        <a:rPr lang="en-US" dirty="0"/>
-                        <a:t>varchar (3)</a:t>
+                        <a:t>name</a:t>
+                      </a:r>
+                    </a:p>
+                  </a:txBody>
+                  <a:tcPr/>
+                </a:tc>
+                <a:tc>
+                  <a:txBody>
+                    <a:bodyPr/>
+                    <a:lstStyle/>
+                    <a:p>
+                      <a:r>
+                        <a:rPr lang="en-US" dirty="0"/>
+                        <a:t>varchar (50)</a:t>
                       </a:r>
                     </a:p>
                   </a:txBody>
@@ -3988,7 +3988,7 @@
                 </a:tc>
                 <a:extLst>
                   <a:ext uri="{0D108BD9-81ED-4DB2-BD59-A6C34878D82A}">
-                    <a16:rowId xmlns:a16="http://schemas.microsoft.com/office/drawing/2014/main" val="3712032683"/>
+                    <a16:rowId xmlns:a16="http://schemas.microsoft.com/office/drawing/2014/main" val="2146610047"/>
                   </a:ext>
                 </a:extLst>
               </a:tr>
@@ -4000,20 +4000,20 @@
                     <a:p>
                       <a:r>
                         <a:rPr lang="en-US" dirty="0"/>
-                        <a:t>city</a:t>
-                      </a:r>
-                    </a:p>
-                  </a:txBody>
-                  <a:tcPr/>
-                </a:tc>
-                <a:tc>
-                  <a:txBody>
-                    <a:bodyPr/>
-                    <a:lstStyle/>
-                    <a:p>
-                      <a:r>
-                        <a:rPr lang="en-US" dirty="0"/>
-                        <a:t>varchar (25)</a:t>
+                        <a:t>code</a:t>
+                      </a:r>
+                    </a:p>
+                  </a:txBody>
+                  <a:tcPr/>
+                </a:tc>
+                <a:tc>
+                  <a:txBody>
+                    <a:bodyPr/>
+                    <a:lstStyle/>
+                    <a:p>
+                      <a:r>
+                        <a:rPr lang="en-US" dirty="0"/>
+                        <a:t>varchar (3)</a:t>
                       </a:r>
                     </a:p>
                   </a:txBody>
@@ -4021,7 +4021,7 @@
                 </a:tc>
                 <a:extLst>
                   <a:ext uri="{0D108BD9-81ED-4DB2-BD59-A6C34878D82A}">
-                    <a16:rowId xmlns:a16="http://schemas.microsoft.com/office/drawing/2014/main" val="3078694358"/>
+                    <a16:rowId xmlns:a16="http://schemas.microsoft.com/office/drawing/2014/main" val="2154520407"/>
                   </a:ext>
                 </a:extLst>
               </a:tr>
@@ -4033,7 +4033,7 @@
                     <a:p>
                       <a:r>
                         <a:rPr lang="en-US" dirty="0"/>
-                        <a:t>state</a:t>
+                        <a:t>city</a:t>
                       </a:r>
                     </a:p>
                   </a:txBody>
@@ -4054,7 +4054,7 @@
                 </a:tc>
                 <a:extLst>
                   <a:ext uri="{0D108BD9-81ED-4DB2-BD59-A6C34878D82A}">
-                    <a16:rowId xmlns:a16="http://schemas.microsoft.com/office/drawing/2014/main" val="3210784663"/>
+                    <a16:rowId xmlns:a16="http://schemas.microsoft.com/office/drawing/2014/main" val="3643492179"/>
                   </a:ext>
                 </a:extLst>
               </a:tr>
@@ -4066,7 +4066,7 @@
                     <a:p>
                       <a:r>
                         <a:rPr lang="en-US" dirty="0"/>
-                        <a:t>country</a:t>
+                        <a:t>state</a:t>
                       </a:r>
                     </a:p>
                   </a:txBody>
@@ -4087,7 +4087,40 @@
                 </a:tc>
                 <a:extLst>
                   <a:ext uri="{0D108BD9-81ED-4DB2-BD59-A6C34878D82A}">
-                    <a16:rowId xmlns:a16="http://schemas.microsoft.com/office/drawing/2014/main" val="3253480604"/>
+                    <a16:rowId xmlns:a16="http://schemas.microsoft.com/office/drawing/2014/main" val="255412590"/>
+                  </a:ext>
+                </a:extLst>
+              </a:tr>
+              <a:tr h="370840">
+                <a:tc>
+                  <a:txBody>
+                    <a:bodyPr/>
+                    <a:lstStyle/>
+                    <a:p>
+                      <a:r>
+                        <a:rPr lang="en-US" dirty="0"/>
+                        <a:t>country</a:t>
+                      </a:r>
+                    </a:p>
+                  </a:txBody>
+                  <a:tcPr/>
+                </a:tc>
+                <a:tc>
+                  <a:txBody>
+                    <a:bodyPr/>
+                    <a:lstStyle/>
+                    <a:p>
+                      <a:r>
+                        <a:rPr lang="en-US" dirty="0"/>
+                        <a:t>varchar (25)</a:t>
+                      </a:r>
+                    </a:p>
+                  </a:txBody>
+                  <a:tcPr/>
+                </a:tc>
+                <a:extLst>
+                  <a:ext uri="{0D108BD9-81ED-4DB2-BD59-A6C34878D82A}">
+                    <a16:rowId xmlns:a16="http://schemas.microsoft.com/office/drawing/2014/main" val="3971576041"/>
                   </a:ext>
                 </a:extLst>
               </a:tr>
@@ -6148,7 +6181,7 @@
         <p:spPr>
           <a:xfrm flipH="1" flipV="1">
             <a:off x="3714621" y="1559570"/>
-            <a:ext cx="2702768" cy="570172"/>
+            <a:ext cx="2749679" cy="430036"/>
           </a:xfrm>
           <a:prstGeom prst="straightConnector1">
             <a:avLst/>
@@ -6189,7 +6222,7 @@
         <p:spPr>
           <a:xfrm flipH="1" flipV="1">
             <a:off x="3671597" y="1959429"/>
-            <a:ext cx="2745792" cy="170313"/>
+            <a:ext cx="2841430" cy="30177"/>
           </a:xfrm>
           <a:prstGeom prst="straightConnector1">
             <a:avLst/>

</xml_diff>